<commit_message>
To add pregame materials and new instructions for the Bot_assist framework. -paul
</commit_message>
<xml_diff>
--- a/shapes/pk/MakeNumerosityShapes.pptx
+++ b/shapes/pk/MakeNumerosityShapes.pptx
@@ -105,6 +105,11 @@
       </a:defRPr>
     </a:lvl9pPr>
   </p:defaultTextStyle>
+  <p:extLst>
+    <p:ext uri="{EFAFB233-063F-42B5-8137-9DF3F51BA10A}">
+      <p15:sldGuideLst xmlns:p15="http://schemas.microsoft.com/office/powerpoint/2012/main"/>
+    </p:ext>
+  </p:extLst>
 </p:presentation>
 </file>
 
@@ -255,7 +260,7 @@
           <a:p>
             <a:fld id="{039929C0-D38E-464F-9A33-0EDD3C56CB8C}" type="datetimeFigureOut">
               <a:rPr lang="en-US" smtClean="0"/>
-              <a:t>6/27/2025</a:t>
+              <a:t>6/30/2025</a:t>
             </a:fld>
             <a:endParaRPr lang="en-US"/>
           </a:p>
@@ -453,7 +458,7 @@
           <a:p>
             <a:fld id="{039929C0-D38E-464F-9A33-0EDD3C56CB8C}" type="datetimeFigureOut">
               <a:rPr lang="en-US" smtClean="0"/>
-              <a:t>6/27/2025</a:t>
+              <a:t>6/30/2025</a:t>
             </a:fld>
             <a:endParaRPr lang="en-US"/>
           </a:p>
@@ -661,7 +666,7 @@
           <a:p>
             <a:fld id="{039929C0-D38E-464F-9A33-0EDD3C56CB8C}" type="datetimeFigureOut">
               <a:rPr lang="en-US" smtClean="0"/>
-              <a:t>6/27/2025</a:t>
+              <a:t>6/30/2025</a:t>
             </a:fld>
             <a:endParaRPr lang="en-US"/>
           </a:p>
@@ -859,7 +864,7 @@
           <a:p>
             <a:fld id="{039929C0-D38E-464F-9A33-0EDD3C56CB8C}" type="datetimeFigureOut">
               <a:rPr lang="en-US" smtClean="0"/>
-              <a:t>6/27/2025</a:t>
+              <a:t>6/30/2025</a:t>
             </a:fld>
             <a:endParaRPr lang="en-US"/>
           </a:p>
@@ -1134,7 +1139,7 @@
           <a:p>
             <a:fld id="{039929C0-D38E-464F-9A33-0EDD3C56CB8C}" type="datetimeFigureOut">
               <a:rPr lang="en-US" smtClean="0"/>
-              <a:t>6/27/2025</a:t>
+              <a:t>6/30/2025</a:t>
             </a:fld>
             <a:endParaRPr lang="en-US"/>
           </a:p>
@@ -1399,7 +1404,7 @@
           <a:p>
             <a:fld id="{039929C0-D38E-464F-9A33-0EDD3C56CB8C}" type="datetimeFigureOut">
               <a:rPr lang="en-US" smtClean="0"/>
-              <a:t>6/27/2025</a:t>
+              <a:t>6/30/2025</a:t>
             </a:fld>
             <a:endParaRPr lang="en-US"/>
           </a:p>
@@ -1811,7 +1816,7 @@
           <a:p>
             <a:fld id="{039929C0-D38E-464F-9A33-0EDD3C56CB8C}" type="datetimeFigureOut">
               <a:rPr lang="en-US" smtClean="0"/>
-              <a:t>6/27/2025</a:t>
+              <a:t>6/30/2025</a:t>
             </a:fld>
             <a:endParaRPr lang="en-US"/>
           </a:p>
@@ -1952,7 +1957,7 @@
           <a:p>
             <a:fld id="{039929C0-D38E-464F-9A33-0EDD3C56CB8C}" type="datetimeFigureOut">
               <a:rPr lang="en-US" smtClean="0"/>
-              <a:t>6/27/2025</a:t>
+              <a:t>6/30/2025</a:t>
             </a:fld>
             <a:endParaRPr lang="en-US"/>
           </a:p>
@@ -2065,7 +2070,7 @@
           <a:p>
             <a:fld id="{039929C0-D38E-464F-9A33-0EDD3C56CB8C}" type="datetimeFigureOut">
               <a:rPr lang="en-US" smtClean="0"/>
-              <a:t>6/27/2025</a:t>
+              <a:t>6/30/2025</a:t>
             </a:fld>
             <a:endParaRPr lang="en-US"/>
           </a:p>
@@ -2376,7 +2381,7 @@
           <a:p>
             <a:fld id="{039929C0-D38E-464F-9A33-0EDD3C56CB8C}" type="datetimeFigureOut">
               <a:rPr lang="en-US" smtClean="0"/>
-              <a:t>6/27/2025</a:t>
+              <a:t>6/30/2025</a:t>
             </a:fld>
             <a:endParaRPr lang="en-US"/>
           </a:p>
@@ -2664,7 +2669,7 @@
           <a:p>
             <a:fld id="{039929C0-D38E-464F-9A33-0EDD3C56CB8C}" type="datetimeFigureOut">
               <a:rPr lang="en-US" smtClean="0"/>
-              <a:t>6/27/2025</a:t>
+              <a:t>6/30/2025</a:t>
             </a:fld>
             <a:endParaRPr lang="en-US"/>
           </a:p>
@@ -2905,7 +2910,7 @@
           <a:p>
             <a:fld id="{039929C0-D38E-464F-9A33-0EDD3C56CB8C}" type="datetimeFigureOut">
               <a:rPr lang="en-US" smtClean="0"/>
-              <a:t>6/27/2025</a:t>
+              <a:t>6/30/2025</a:t>
             </a:fld>
             <a:endParaRPr lang="en-US"/>
           </a:p>
@@ -3404,31 +3409,6 @@
       </p:grpSpPr>
       <p:sp>
         <p:nvSpPr>
-          <p:cNvPr id="2" name="Title 1">
-            <a:extLst>
-              <a:ext uri="{FF2B5EF4-FFF2-40B4-BE49-F238E27FC236}">
-                <a16:creationId xmlns:a16="http://schemas.microsoft.com/office/drawing/2014/main" id="{58EC3ECC-98DB-B8D0-6D42-88F9A7632D0C}"/>
-              </a:ext>
-            </a:extLst>
-          </p:cNvPr>
-          <p:cNvSpPr>
-            <a:spLocks noGrp="1"/>
-          </p:cNvSpPr>
-          <p:nvPr>
-            <p:ph type="title"/>
-          </p:nvPr>
-        </p:nvSpPr>
-        <p:spPr/>
-        <p:txBody>
-          <a:bodyPr/>
-          <a:lstStyle/>
-          <a:p>
-            <a:endParaRPr lang="en-US"/>
-          </a:p>
-        </p:txBody>
-      </p:sp>
-      <p:sp>
-        <p:nvSpPr>
           <p:cNvPr id="4" name="Rectangle 3">
             <a:extLst>
               <a:ext uri="{FF2B5EF4-FFF2-40B4-BE49-F238E27FC236}">
@@ -3447,6 +3427,7 @@
           <a:prstGeom prst="rect">
             <a:avLst/>
           </a:prstGeom>
+          <a:noFill/>
         </p:spPr>
         <p:style>
           <a:lnRef idx="2">
@@ -3493,6 +3474,7 @@
           <a:prstGeom prst="rect">
             <a:avLst/>
           </a:prstGeom>
+          <a:noFill/>
         </p:spPr>
         <p:style>
           <a:lnRef idx="2">
@@ -3539,6 +3521,7 @@
           <a:prstGeom prst="rect">
             <a:avLst/>
           </a:prstGeom>
+          <a:noFill/>
         </p:spPr>
         <p:style>
           <a:lnRef idx="2">
@@ -3585,6 +3568,7 @@
           <a:prstGeom prst="rect">
             <a:avLst/>
           </a:prstGeom>
+          <a:noFill/>
         </p:spPr>
         <p:style>
           <a:lnRef idx="2">
@@ -3631,6 +3615,7 @@
           <a:prstGeom prst="rect">
             <a:avLst/>
           </a:prstGeom>
+          <a:noFill/>
         </p:spPr>
         <p:style>
           <a:lnRef idx="2">
@@ -3677,6 +3662,7 @@
           <a:prstGeom prst="rect">
             <a:avLst/>
           </a:prstGeom>
+          <a:noFill/>
         </p:spPr>
         <p:style>
           <a:lnRef idx="2">
@@ -3723,6 +3709,7 @@
           <a:prstGeom prst="rect">
             <a:avLst/>
           </a:prstGeom>
+          <a:noFill/>
         </p:spPr>
         <p:style>
           <a:lnRef idx="2">
@@ -3769,6 +3756,7 @@
           <a:prstGeom prst="rect">
             <a:avLst/>
           </a:prstGeom>
+          <a:noFill/>
         </p:spPr>
         <p:style>
           <a:lnRef idx="2">
@@ -3815,6 +3803,7 @@
           <a:prstGeom prst="rect">
             <a:avLst/>
           </a:prstGeom>
+          <a:noFill/>
         </p:spPr>
         <p:style>
           <a:lnRef idx="2">
@@ -3861,6 +3850,714 @@
           <a:prstGeom prst="rect">
             <a:avLst/>
           </a:prstGeom>
+          <a:noFill/>
+        </p:spPr>
+        <p:style>
+          <a:lnRef idx="2">
+            <a:schemeClr val="accent1">
+              <a:shade val="15000"/>
+            </a:schemeClr>
+          </a:lnRef>
+          <a:fillRef idx="1">
+            <a:schemeClr val="accent1"/>
+          </a:fillRef>
+          <a:effectRef idx="0">
+            <a:schemeClr val="accent1"/>
+          </a:effectRef>
+          <a:fontRef idx="minor">
+            <a:schemeClr val="lt1"/>
+          </a:fontRef>
+        </p:style>
+        <p:txBody>
+          <a:bodyPr rtlCol="0" anchor="ctr"/>
+          <a:lstStyle/>
+          <a:p>
+            <a:pPr algn="ctr"/>
+            <a:endParaRPr lang="en-US"/>
+          </a:p>
+        </p:txBody>
+      </p:sp>
+      <p:cxnSp>
+        <p:nvCxnSpPr>
+          <p:cNvPr id="3" name="Straight Connector 2">
+            <a:extLst>
+              <a:ext uri="{FF2B5EF4-FFF2-40B4-BE49-F238E27FC236}">
+                <a16:creationId xmlns:a16="http://schemas.microsoft.com/office/drawing/2014/main" id="{D02FC6F6-E8E3-CF60-377D-32D343351DDA}"/>
+              </a:ext>
+            </a:extLst>
+          </p:cNvPr>
+          <p:cNvCxnSpPr/>
+          <p:nvPr/>
+        </p:nvCxnSpPr>
+        <p:spPr>
+          <a:xfrm flipV="1">
+            <a:off x="5225143" y="3301340"/>
+            <a:ext cx="463138" cy="605642"/>
+          </a:xfrm>
+          <a:prstGeom prst="line">
+            <a:avLst/>
+          </a:prstGeom>
+        </p:spPr>
+        <p:style>
+          <a:lnRef idx="2">
+            <a:schemeClr val="accent1"/>
+          </a:lnRef>
+          <a:fillRef idx="0">
+            <a:schemeClr val="accent1"/>
+          </a:fillRef>
+          <a:effectRef idx="1">
+            <a:schemeClr val="accent1"/>
+          </a:effectRef>
+          <a:fontRef idx="minor">
+            <a:schemeClr val="tx1"/>
+          </a:fontRef>
+        </p:style>
+      </p:cxnSp>
+      <p:sp>
+        <p:nvSpPr>
+          <p:cNvPr id="11" name="Freeform: Shape 10">
+            <a:extLst>
+              <a:ext uri="{FF2B5EF4-FFF2-40B4-BE49-F238E27FC236}">
+                <a16:creationId xmlns:a16="http://schemas.microsoft.com/office/drawing/2014/main" id="{49002B87-6586-F410-661B-C269A6B3886C}"/>
+              </a:ext>
+            </a:extLst>
+          </p:cNvPr>
+          <p:cNvSpPr/>
+          <p:nvPr/>
+        </p:nvSpPr>
+        <p:spPr>
+          <a:xfrm>
+            <a:off x="6935190" y="3063834"/>
+            <a:ext cx="1678341" cy="1075951"/>
+          </a:xfrm>
+          <a:custGeom>
+            <a:avLst/>
+            <a:gdLst>
+              <a:gd name="connsiteX0" fmla="*/ 201880 w 1678341"/>
+              <a:gd name="connsiteY0" fmla="*/ 0 h 1075951"/>
+              <a:gd name="connsiteX1" fmla="*/ 926275 w 1678341"/>
+              <a:gd name="connsiteY1" fmla="*/ 581891 h 1075951"/>
+              <a:gd name="connsiteX2" fmla="*/ 1056904 w 1678341"/>
+              <a:gd name="connsiteY2" fmla="*/ 1068779 h 1075951"/>
+              <a:gd name="connsiteX3" fmla="*/ 1674420 w 1678341"/>
+              <a:gd name="connsiteY3" fmla="*/ 201880 h 1075951"/>
+              <a:gd name="connsiteX4" fmla="*/ 724394 w 1678341"/>
+              <a:gd name="connsiteY4" fmla="*/ 380010 h 1075951"/>
+              <a:gd name="connsiteX5" fmla="*/ 0 w 1678341"/>
+              <a:gd name="connsiteY5" fmla="*/ 415636 h 1075951"/>
+              <a:gd name="connsiteX6" fmla="*/ 0 w 1678341"/>
+              <a:gd name="connsiteY6" fmla="*/ 415636 h 1075951"/>
+            </a:gdLst>
+            <a:ahLst/>
+            <a:cxnLst>
+              <a:cxn ang="0">
+                <a:pos x="connsiteX0" y="connsiteY0"/>
+              </a:cxn>
+              <a:cxn ang="0">
+                <a:pos x="connsiteX1" y="connsiteY1"/>
+              </a:cxn>
+              <a:cxn ang="0">
+                <a:pos x="connsiteX2" y="connsiteY2"/>
+              </a:cxn>
+              <a:cxn ang="0">
+                <a:pos x="connsiteX3" y="connsiteY3"/>
+              </a:cxn>
+              <a:cxn ang="0">
+                <a:pos x="connsiteX4" y="connsiteY4"/>
+              </a:cxn>
+              <a:cxn ang="0">
+                <a:pos x="connsiteX5" y="connsiteY5"/>
+              </a:cxn>
+              <a:cxn ang="0">
+                <a:pos x="connsiteX6" y="connsiteY6"/>
+              </a:cxn>
+            </a:cxnLst>
+            <a:rect l="l" t="t" r="r" b="b"/>
+            <a:pathLst>
+              <a:path w="1678341" h="1075951">
+                <a:moveTo>
+                  <a:pt x="201880" y="0"/>
+                </a:moveTo>
+                <a:cubicBezTo>
+                  <a:pt x="492825" y="201880"/>
+                  <a:pt x="783771" y="403761"/>
+                  <a:pt x="926275" y="581891"/>
+                </a:cubicBezTo>
+                <a:cubicBezTo>
+                  <a:pt x="1068779" y="760021"/>
+                  <a:pt x="932213" y="1132114"/>
+                  <a:pt x="1056904" y="1068779"/>
+                </a:cubicBezTo>
+                <a:cubicBezTo>
+                  <a:pt x="1181595" y="1005444"/>
+                  <a:pt x="1729838" y="316675"/>
+                  <a:pt x="1674420" y="201880"/>
+                </a:cubicBezTo>
+                <a:cubicBezTo>
+                  <a:pt x="1619002" y="87085"/>
+                  <a:pt x="1003464" y="344384"/>
+                  <a:pt x="724394" y="380010"/>
+                </a:cubicBezTo>
+                <a:cubicBezTo>
+                  <a:pt x="445324" y="415636"/>
+                  <a:pt x="0" y="415636"/>
+                  <a:pt x="0" y="415636"/>
+                </a:cubicBezTo>
+                <a:lnTo>
+                  <a:pt x="0" y="415636"/>
+                </a:lnTo>
+              </a:path>
+            </a:pathLst>
+          </a:custGeom>
+          <a:noFill/>
+        </p:spPr>
+        <p:style>
+          <a:lnRef idx="2">
+            <a:schemeClr val="accent1">
+              <a:shade val="15000"/>
+            </a:schemeClr>
+          </a:lnRef>
+          <a:fillRef idx="1">
+            <a:schemeClr val="accent1"/>
+          </a:fillRef>
+          <a:effectRef idx="0">
+            <a:schemeClr val="accent1"/>
+          </a:effectRef>
+          <a:fontRef idx="minor">
+            <a:schemeClr val="lt1"/>
+          </a:fontRef>
+        </p:style>
+        <p:txBody>
+          <a:bodyPr rtlCol="0" anchor="ctr"/>
+          <a:lstStyle/>
+          <a:p>
+            <a:pPr algn="ctr"/>
+            <a:endParaRPr lang="en-US"/>
+          </a:p>
+        </p:txBody>
+      </p:sp>
+      <p:cxnSp>
+        <p:nvCxnSpPr>
+          <p:cNvPr id="15" name="Straight Connector 14">
+            <a:extLst>
+              <a:ext uri="{FF2B5EF4-FFF2-40B4-BE49-F238E27FC236}">
+                <a16:creationId xmlns:a16="http://schemas.microsoft.com/office/drawing/2014/main" id="{5475B1EF-505E-7ACE-4CE6-BF936F6C653E}"/>
+              </a:ext>
+            </a:extLst>
+          </p:cNvPr>
+          <p:cNvCxnSpPr/>
+          <p:nvPr/>
+        </p:nvCxnSpPr>
+        <p:spPr>
+          <a:xfrm>
+            <a:off x="5688281" y="3301340"/>
+            <a:ext cx="407719" cy="510639"/>
+          </a:xfrm>
+          <a:prstGeom prst="line">
+            <a:avLst/>
+          </a:prstGeom>
+        </p:spPr>
+        <p:style>
+          <a:lnRef idx="2">
+            <a:schemeClr val="accent1"/>
+          </a:lnRef>
+          <a:fillRef idx="0">
+            <a:schemeClr val="accent1"/>
+          </a:fillRef>
+          <a:effectRef idx="1">
+            <a:schemeClr val="accent1"/>
+          </a:effectRef>
+          <a:fontRef idx="minor">
+            <a:schemeClr val="tx1"/>
+          </a:fontRef>
+        </p:style>
+      </p:cxnSp>
+      <p:sp>
+        <p:nvSpPr>
+          <p:cNvPr id="17" name="Freeform: Shape 16">
+            <a:extLst>
+              <a:ext uri="{FF2B5EF4-FFF2-40B4-BE49-F238E27FC236}">
+                <a16:creationId xmlns:a16="http://schemas.microsoft.com/office/drawing/2014/main" id="{6FEF3591-1A12-CF36-4C6A-AA50843522FB}"/>
+              </a:ext>
+            </a:extLst>
+          </p:cNvPr>
+          <p:cNvSpPr/>
+          <p:nvPr/>
+        </p:nvSpPr>
+        <p:spPr>
+          <a:xfrm>
+            <a:off x="2434442" y="3800104"/>
+            <a:ext cx="1045028" cy="1320813"/>
+          </a:xfrm>
+          <a:custGeom>
+            <a:avLst/>
+            <a:gdLst>
+              <a:gd name="connsiteX0" fmla="*/ 0 w 1045028"/>
+              <a:gd name="connsiteY0" fmla="*/ 617517 h 1320813"/>
+              <a:gd name="connsiteX1" fmla="*/ 0 w 1045028"/>
+              <a:gd name="connsiteY1" fmla="*/ 617517 h 1320813"/>
+              <a:gd name="connsiteX2" fmla="*/ 118753 w 1045028"/>
+              <a:gd name="connsiteY2" fmla="*/ 510639 h 1320813"/>
+              <a:gd name="connsiteX3" fmla="*/ 249381 w 1045028"/>
+              <a:gd name="connsiteY3" fmla="*/ 415636 h 1320813"/>
+              <a:gd name="connsiteX4" fmla="*/ 320633 w 1045028"/>
+              <a:gd name="connsiteY4" fmla="*/ 356260 h 1320813"/>
+              <a:gd name="connsiteX5" fmla="*/ 368135 w 1045028"/>
+              <a:gd name="connsiteY5" fmla="*/ 261257 h 1320813"/>
+              <a:gd name="connsiteX6" fmla="*/ 391885 w 1045028"/>
+              <a:gd name="connsiteY6" fmla="*/ 225631 h 1320813"/>
+              <a:gd name="connsiteX7" fmla="*/ 534389 w 1045028"/>
+              <a:gd name="connsiteY7" fmla="*/ 118753 h 1320813"/>
+              <a:gd name="connsiteX8" fmla="*/ 581890 w 1045028"/>
+              <a:gd name="connsiteY8" fmla="*/ 0 h 1320813"/>
+              <a:gd name="connsiteX9" fmla="*/ 593766 w 1045028"/>
+              <a:gd name="connsiteY9" fmla="*/ 23751 h 1320813"/>
+              <a:gd name="connsiteX10" fmla="*/ 676893 w 1045028"/>
+              <a:gd name="connsiteY10" fmla="*/ 178130 h 1320813"/>
+              <a:gd name="connsiteX11" fmla="*/ 724394 w 1045028"/>
+              <a:gd name="connsiteY11" fmla="*/ 225631 h 1320813"/>
+              <a:gd name="connsiteX12" fmla="*/ 760020 w 1045028"/>
+              <a:gd name="connsiteY12" fmla="*/ 296883 h 1320813"/>
+              <a:gd name="connsiteX13" fmla="*/ 819397 w 1045028"/>
+              <a:gd name="connsiteY13" fmla="*/ 332509 h 1320813"/>
+              <a:gd name="connsiteX14" fmla="*/ 878774 w 1045028"/>
+              <a:gd name="connsiteY14" fmla="*/ 391886 h 1320813"/>
+              <a:gd name="connsiteX15" fmla="*/ 926275 w 1045028"/>
+              <a:gd name="connsiteY15" fmla="*/ 486888 h 1320813"/>
+              <a:gd name="connsiteX16" fmla="*/ 950026 w 1045028"/>
+              <a:gd name="connsiteY16" fmla="*/ 534390 h 1320813"/>
+              <a:gd name="connsiteX17" fmla="*/ 985652 w 1045028"/>
+              <a:gd name="connsiteY17" fmla="*/ 581891 h 1320813"/>
+              <a:gd name="connsiteX18" fmla="*/ 985652 w 1045028"/>
+              <a:gd name="connsiteY18" fmla="*/ 581891 h 1320813"/>
+              <a:gd name="connsiteX19" fmla="*/ 1009402 w 1045028"/>
+              <a:gd name="connsiteY19" fmla="*/ 1021278 h 1320813"/>
+              <a:gd name="connsiteX20" fmla="*/ 1045028 w 1045028"/>
+              <a:gd name="connsiteY20" fmla="*/ 1187532 h 1320813"/>
+              <a:gd name="connsiteX21" fmla="*/ 1033153 w 1045028"/>
+              <a:gd name="connsiteY21" fmla="*/ 1270660 h 1320813"/>
+              <a:gd name="connsiteX22" fmla="*/ 1033153 w 1045028"/>
+              <a:gd name="connsiteY22" fmla="*/ 1270660 h 1320813"/>
+              <a:gd name="connsiteX23" fmla="*/ 890649 w 1045028"/>
+              <a:gd name="connsiteY23" fmla="*/ 1223158 h 1320813"/>
+              <a:gd name="connsiteX24" fmla="*/ 629392 w 1045028"/>
+              <a:gd name="connsiteY24" fmla="*/ 1282535 h 1320813"/>
+              <a:gd name="connsiteX25" fmla="*/ 391885 w 1045028"/>
+              <a:gd name="connsiteY25" fmla="*/ 1294410 h 1320813"/>
+              <a:gd name="connsiteX26" fmla="*/ 308758 w 1045028"/>
+              <a:gd name="connsiteY26" fmla="*/ 1270660 h 1320813"/>
+              <a:gd name="connsiteX27" fmla="*/ 118753 w 1045028"/>
+              <a:gd name="connsiteY27" fmla="*/ 1235034 h 1320813"/>
+              <a:gd name="connsiteX28" fmla="*/ 95002 w 1045028"/>
+              <a:gd name="connsiteY28" fmla="*/ 1282535 h 1320813"/>
+              <a:gd name="connsiteX29" fmla="*/ 130628 w 1045028"/>
+              <a:gd name="connsiteY29" fmla="*/ 1318161 h 1320813"/>
+              <a:gd name="connsiteX30" fmla="*/ 95002 w 1045028"/>
+              <a:gd name="connsiteY30" fmla="*/ 1258784 h 1320813"/>
+              <a:gd name="connsiteX31" fmla="*/ 95002 w 1045028"/>
+              <a:gd name="connsiteY31" fmla="*/ 1258784 h 1320813"/>
+              <a:gd name="connsiteX32" fmla="*/ 83127 w 1045028"/>
+              <a:gd name="connsiteY32" fmla="*/ 855023 h 1320813"/>
+              <a:gd name="connsiteX33" fmla="*/ 59376 w 1045028"/>
+              <a:gd name="connsiteY33" fmla="*/ 819397 h 1320813"/>
+              <a:gd name="connsiteX34" fmla="*/ 11875 w 1045028"/>
+              <a:gd name="connsiteY34" fmla="*/ 688769 h 1320813"/>
+              <a:gd name="connsiteX35" fmla="*/ 35626 w 1045028"/>
+              <a:gd name="connsiteY35" fmla="*/ 570015 h 1320813"/>
+              <a:gd name="connsiteX36" fmla="*/ 0 w 1045028"/>
+              <a:gd name="connsiteY36" fmla="*/ 617517 h 1320813"/>
+            </a:gdLst>
+            <a:ahLst/>
+            <a:cxnLst>
+              <a:cxn ang="0">
+                <a:pos x="connsiteX0" y="connsiteY0"/>
+              </a:cxn>
+              <a:cxn ang="0">
+                <a:pos x="connsiteX1" y="connsiteY1"/>
+              </a:cxn>
+              <a:cxn ang="0">
+                <a:pos x="connsiteX2" y="connsiteY2"/>
+              </a:cxn>
+              <a:cxn ang="0">
+                <a:pos x="connsiteX3" y="connsiteY3"/>
+              </a:cxn>
+              <a:cxn ang="0">
+                <a:pos x="connsiteX4" y="connsiteY4"/>
+              </a:cxn>
+              <a:cxn ang="0">
+                <a:pos x="connsiteX5" y="connsiteY5"/>
+              </a:cxn>
+              <a:cxn ang="0">
+                <a:pos x="connsiteX6" y="connsiteY6"/>
+              </a:cxn>
+              <a:cxn ang="0">
+                <a:pos x="connsiteX7" y="connsiteY7"/>
+              </a:cxn>
+              <a:cxn ang="0">
+                <a:pos x="connsiteX8" y="connsiteY8"/>
+              </a:cxn>
+              <a:cxn ang="0">
+                <a:pos x="connsiteX9" y="connsiteY9"/>
+              </a:cxn>
+              <a:cxn ang="0">
+                <a:pos x="connsiteX10" y="connsiteY10"/>
+              </a:cxn>
+              <a:cxn ang="0">
+                <a:pos x="connsiteX11" y="connsiteY11"/>
+              </a:cxn>
+              <a:cxn ang="0">
+                <a:pos x="connsiteX12" y="connsiteY12"/>
+              </a:cxn>
+              <a:cxn ang="0">
+                <a:pos x="connsiteX13" y="connsiteY13"/>
+              </a:cxn>
+              <a:cxn ang="0">
+                <a:pos x="connsiteX14" y="connsiteY14"/>
+              </a:cxn>
+              <a:cxn ang="0">
+                <a:pos x="connsiteX15" y="connsiteY15"/>
+              </a:cxn>
+              <a:cxn ang="0">
+                <a:pos x="connsiteX16" y="connsiteY16"/>
+              </a:cxn>
+              <a:cxn ang="0">
+                <a:pos x="connsiteX17" y="connsiteY17"/>
+              </a:cxn>
+              <a:cxn ang="0">
+                <a:pos x="connsiteX18" y="connsiteY18"/>
+              </a:cxn>
+              <a:cxn ang="0">
+                <a:pos x="connsiteX19" y="connsiteY19"/>
+              </a:cxn>
+              <a:cxn ang="0">
+                <a:pos x="connsiteX20" y="connsiteY20"/>
+              </a:cxn>
+              <a:cxn ang="0">
+                <a:pos x="connsiteX21" y="connsiteY21"/>
+              </a:cxn>
+              <a:cxn ang="0">
+                <a:pos x="connsiteX22" y="connsiteY22"/>
+              </a:cxn>
+              <a:cxn ang="0">
+                <a:pos x="connsiteX23" y="connsiteY23"/>
+              </a:cxn>
+              <a:cxn ang="0">
+                <a:pos x="connsiteX24" y="connsiteY24"/>
+              </a:cxn>
+              <a:cxn ang="0">
+                <a:pos x="connsiteX25" y="connsiteY25"/>
+              </a:cxn>
+              <a:cxn ang="0">
+                <a:pos x="connsiteX26" y="connsiteY26"/>
+              </a:cxn>
+              <a:cxn ang="0">
+                <a:pos x="connsiteX27" y="connsiteY27"/>
+              </a:cxn>
+              <a:cxn ang="0">
+                <a:pos x="connsiteX28" y="connsiteY28"/>
+              </a:cxn>
+              <a:cxn ang="0">
+                <a:pos x="connsiteX29" y="connsiteY29"/>
+              </a:cxn>
+              <a:cxn ang="0">
+                <a:pos x="connsiteX30" y="connsiteY30"/>
+              </a:cxn>
+              <a:cxn ang="0">
+                <a:pos x="connsiteX31" y="connsiteY31"/>
+              </a:cxn>
+              <a:cxn ang="0">
+                <a:pos x="connsiteX32" y="connsiteY32"/>
+              </a:cxn>
+              <a:cxn ang="0">
+                <a:pos x="connsiteX33" y="connsiteY33"/>
+              </a:cxn>
+              <a:cxn ang="0">
+                <a:pos x="connsiteX34" y="connsiteY34"/>
+              </a:cxn>
+              <a:cxn ang="0">
+                <a:pos x="connsiteX35" y="connsiteY35"/>
+              </a:cxn>
+              <a:cxn ang="0">
+                <a:pos x="connsiteX36" y="connsiteY36"/>
+              </a:cxn>
+            </a:cxnLst>
+            <a:rect l="l" t="t" r="r" b="b"/>
+            <a:pathLst>
+              <a:path w="1045028" h="1320813">
+                <a:moveTo>
+                  <a:pt x="0" y="617517"/>
+                </a:moveTo>
+                <a:lnTo>
+                  <a:pt x="0" y="617517"/>
+                </a:lnTo>
+                <a:cubicBezTo>
+                  <a:pt x="39584" y="581891"/>
+                  <a:pt x="77361" y="544147"/>
+                  <a:pt x="118753" y="510639"/>
+                </a:cubicBezTo>
+                <a:cubicBezTo>
+                  <a:pt x="160600" y="476763"/>
+                  <a:pt x="208019" y="450104"/>
+                  <a:pt x="249381" y="415636"/>
+                </a:cubicBezTo>
+                <a:lnTo>
+                  <a:pt x="320633" y="356260"/>
+                </a:lnTo>
+                <a:cubicBezTo>
+                  <a:pt x="336467" y="324592"/>
+                  <a:pt x="351181" y="292339"/>
+                  <a:pt x="368135" y="261257"/>
+                </a:cubicBezTo>
+                <a:cubicBezTo>
+                  <a:pt x="374969" y="248727"/>
+                  <a:pt x="381049" y="234919"/>
+                  <a:pt x="391885" y="225631"/>
+                </a:cubicBezTo>
+                <a:cubicBezTo>
+                  <a:pt x="436967" y="186989"/>
+                  <a:pt x="486888" y="154379"/>
+                  <a:pt x="534389" y="118753"/>
+                </a:cubicBezTo>
+                <a:cubicBezTo>
+                  <a:pt x="569336" y="48860"/>
+                  <a:pt x="552542" y="88046"/>
+                  <a:pt x="581890" y="0"/>
+                </a:cubicBezTo>
+                <a:lnTo>
+                  <a:pt x="593766" y="23751"/>
+                </a:lnTo>
+                <a:cubicBezTo>
+                  <a:pt x="621475" y="75211"/>
+                  <a:pt x="645142" y="129061"/>
+                  <a:pt x="676893" y="178130"/>
+                </a:cubicBezTo>
+                <a:cubicBezTo>
+                  <a:pt x="689058" y="196930"/>
+                  <a:pt x="711379" y="207410"/>
+                  <a:pt x="724394" y="225631"/>
+                </a:cubicBezTo>
+                <a:cubicBezTo>
+                  <a:pt x="757204" y="271565"/>
+                  <a:pt x="710605" y="254527"/>
+                  <a:pt x="760020" y="296883"/>
+                </a:cubicBezTo>
+                <a:cubicBezTo>
+                  <a:pt x="777545" y="311904"/>
+                  <a:pt x="801373" y="318090"/>
+                  <a:pt x="819397" y="332509"/>
+                </a:cubicBezTo>
+                <a:cubicBezTo>
+                  <a:pt x="841254" y="349995"/>
+                  <a:pt x="858982" y="372094"/>
+                  <a:pt x="878774" y="391886"/>
+                </a:cubicBezTo>
+                <a:lnTo>
+                  <a:pt x="926275" y="486888"/>
+                </a:lnTo>
+                <a:cubicBezTo>
+                  <a:pt x="934192" y="502722"/>
+                  <a:pt x="939404" y="520228"/>
+                  <a:pt x="950026" y="534390"/>
+                </a:cubicBezTo>
+                <a:lnTo>
+                  <a:pt x="985652" y="581891"/>
+                </a:lnTo>
+                <a:lnTo>
+                  <a:pt x="985652" y="581891"/>
+                </a:lnTo>
+                <a:cubicBezTo>
+                  <a:pt x="993569" y="728353"/>
+                  <a:pt x="973827" y="878981"/>
+                  <a:pt x="1009402" y="1021278"/>
+                </a:cubicBezTo>
+                <a:cubicBezTo>
+                  <a:pt x="1015620" y="1046149"/>
+                  <a:pt x="1045028" y="1153045"/>
+                  <a:pt x="1045028" y="1187532"/>
+                </a:cubicBezTo>
+                <a:cubicBezTo>
+                  <a:pt x="1045028" y="1215523"/>
+                  <a:pt x="1037111" y="1242951"/>
+                  <a:pt x="1033153" y="1270660"/>
+                </a:cubicBezTo>
+                <a:lnTo>
+                  <a:pt x="1033153" y="1270660"/>
+                </a:lnTo>
+                <a:cubicBezTo>
+                  <a:pt x="985652" y="1254826"/>
+                  <a:pt x="940261" y="1229923"/>
+                  <a:pt x="890649" y="1223158"/>
+                </a:cubicBezTo>
+                <a:cubicBezTo>
+                  <a:pt x="806908" y="1211739"/>
+                  <a:pt x="702861" y="1258045"/>
+                  <a:pt x="629392" y="1282535"/>
+                </a:cubicBezTo>
+                <a:cubicBezTo>
+                  <a:pt x="332868" y="1245471"/>
+                  <a:pt x="797848" y="1294410"/>
+                  <a:pt x="391885" y="1294410"/>
+                </a:cubicBezTo>
+                <a:cubicBezTo>
+                  <a:pt x="363067" y="1294410"/>
+                  <a:pt x="336918" y="1276782"/>
+                  <a:pt x="308758" y="1270660"/>
+                </a:cubicBezTo>
+                <a:cubicBezTo>
+                  <a:pt x="245790" y="1256971"/>
+                  <a:pt x="182088" y="1246909"/>
+                  <a:pt x="118753" y="1235034"/>
+                </a:cubicBezTo>
+                <a:cubicBezTo>
+                  <a:pt x="110836" y="1250868"/>
+                  <a:pt x="92499" y="1265010"/>
+                  <a:pt x="95002" y="1282535"/>
+                </a:cubicBezTo>
+                <a:cubicBezTo>
+                  <a:pt x="97377" y="1299160"/>
+                  <a:pt x="118753" y="1330036"/>
+                  <a:pt x="130628" y="1318161"/>
+                </a:cubicBezTo>
+                <a:cubicBezTo>
+                  <a:pt x="143753" y="1305036"/>
+                  <a:pt x="106941" y="1270724"/>
+                  <a:pt x="95002" y="1258784"/>
+                </a:cubicBezTo>
+                <a:lnTo>
+                  <a:pt x="95002" y="1258784"/>
+                </a:lnTo>
+                <a:cubicBezTo>
+                  <a:pt x="107304" y="1074244"/>
+                  <a:pt x="118956" y="1052085"/>
+                  <a:pt x="83127" y="855023"/>
+                </a:cubicBezTo>
+                <a:cubicBezTo>
+                  <a:pt x="80574" y="840981"/>
+                  <a:pt x="64998" y="832515"/>
+                  <a:pt x="59376" y="819397"/>
+                </a:cubicBezTo>
+                <a:cubicBezTo>
+                  <a:pt x="41125" y="776811"/>
+                  <a:pt x="27709" y="732312"/>
+                  <a:pt x="11875" y="688769"/>
+                </a:cubicBezTo>
+                <a:cubicBezTo>
+                  <a:pt x="36485" y="578027"/>
+                  <a:pt x="35626" y="618386"/>
+                  <a:pt x="35626" y="570015"/>
+                </a:cubicBezTo>
+                <a:lnTo>
+                  <a:pt x="0" y="617517"/>
+                </a:lnTo>
+                <a:close/>
+              </a:path>
+            </a:pathLst>
+          </a:custGeom>
+        </p:spPr>
+        <p:style>
+          <a:lnRef idx="2">
+            <a:schemeClr val="accent1">
+              <a:shade val="15000"/>
+            </a:schemeClr>
+          </a:lnRef>
+          <a:fillRef idx="1">
+            <a:schemeClr val="accent1"/>
+          </a:fillRef>
+          <a:effectRef idx="0">
+            <a:schemeClr val="accent1"/>
+          </a:effectRef>
+          <a:fontRef idx="minor">
+            <a:schemeClr val="lt1"/>
+          </a:fontRef>
+        </p:style>
+        <p:txBody>
+          <a:bodyPr rtlCol="0" anchor="ctr"/>
+          <a:lstStyle/>
+          <a:p>
+            <a:pPr algn="ctr"/>
+            <a:endParaRPr lang="en-US"/>
+          </a:p>
+        </p:txBody>
+      </p:sp>
+      <p:sp>
+        <p:nvSpPr>
+          <p:cNvPr id="18" name="Freeform: Shape 17">
+            <a:extLst>
+              <a:ext uri="{FF2B5EF4-FFF2-40B4-BE49-F238E27FC236}">
+                <a16:creationId xmlns:a16="http://schemas.microsoft.com/office/drawing/2014/main" id="{66C84600-D47A-341C-39E7-0F21B466204A}"/>
+              </a:ext>
+            </a:extLst>
+          </p:cNvPr>
+          <p:cNvSpPr/>
+          <p:nvPr/>
+        </p:nvSpPr>
+        <p:spPr>
+          <a:xfrm>
+            <a:off x="8217725" y="4572000"/>
+            <a:ext cx="1235033" cy="1306286"/>
+          </a:xfrm>
+          <a:custGeom>
+            <a:avLst/>
+            <a:gdLst>
+              <a:gd name="connsiteX0" fmla="*/ 0 w 1235033"/>
+              <a:gd name="connsiteY0" fmla="*/ 1306286 h 1306286"/>
+              <a:gd name="connsiteX1" fmla="*/ 0 w 1235033"/>
+              <a:gd name="connsiteY1" fmla="*/ 593766 h 1306286"/>
+              <a:gd name="connsiteX2" fmla="*/ 605641 w 1235033"/>
+              <a:gd name="connsiteY2" fmla="*/ 0 h 1306286"/>
+              <a:gd name="connsiteX3" fmla="*/ 1199407 w 1235033"/>
+              <a:gd name="connsiteY3" fmla="*/ 475013 h 1306286"/>
+              <a:gd name="connsiteX4" fmla="*/ 1235033 w 1235033"/>
+              <a:gd name="connsiteY4" fmla="*/ 1282535 h 1306286"/>
+              <a:gd name="connsiteX5" fmla="*/ 0 w 1235033"/>
+              <a:gd name="connsiteY5" fmla="*/ 1306286 h 1306286"/>
+            </a:gdLst>
+            <a:ahLst/>
+            <a:cxnLst>
+              <a:cxn ang="0">
+                <a:pos x="connsiteX0" y="connsiteY0"/>
+              </a:cxn>
+              <a:cxn ang="0">
+                <a:pos x="connsiteX1" y="connsiteY1"/>
+              </a:cxn>
+              <a:cxn ang="0">
+                <a:pos x="connsiteX2" y="connsiteY2"/>
+              </a:cxn>
+              <a:cxn ang="0">
+                <a:pos x="connsiteX3" y="connsiteY3"/>
+              </a:cxn>
+              <a:cxn ang="0">
+                <a:pos x="connsiteX4" y="connsiteY4"/>
+              </a:cxn>
+              <a:cxn ang="0">
+                <a:pos x="connsiteX5" y="connsiteY5"/>
+              </a:cxn>
+            </a:cxnLst>
+            <a:rect l="l" t="t" r="r" b="b"/>
+            <a:pathLst>
+              <a:path w="1235033" h="1306286">
+                <a:moveTo>
+                  <a:pt x="0" y="1306286"/>
+                </a:moveTo>
+                <a:lnTo>
+                  <a:pt x="0" y="593766"/>
+                </a:lnTo>
+                <a:lnTo>
+                  <a:pt x="605641" y="0"/>
+                </a:lnTo>
+                <a:lnTo>
+                  <a:pt x="1199407" y="475013"/>
+                </a:lnTo>
+                <a:lnTo>
+                  <a:pt x="1235033" y="1282535"/>
+                </a:lnTo>
+                <a:lnTo>
+                  <a:pt x="0" y="1306286"/>
+                </a:lnTo>
+                <a:close/>
+              </a:path>
+            </a:pathLst>
+          </a:custGeom>
         </p:spPr>
         <p:style>
           <a:lnRef idx="2">

</xml_diff>